<commit_message>
Please dont touch git for next hours
</commit_message>
<xml_diff>
--- a/Final_Project/FeedbackPresentation.pptx
+++ b/Final_Project/FeedbackPresentation.pptx
@@ -5,25 +5,26 @@
     <p:sldMasterId id="2147483662" r:id="rId7"/>
   </p:sldMasterIdLst>
   <p:notesMasterIdLst>
-    <p:notesMasterId r:id="rId16"/>
+    <p:notesMasterId r:id="rId17"/>
   </p:notesMasterIdLst>
   <p:handoutMasterIdLst>
-    <p:handoutMasterId r:id="rId17"/>
+    <p:handoutMasterId r:id="rId18"/>
   </p:handoutMasterIdLst>
   <p:sldIdLst>
     <p:sldId id="260" r:id="rId8"/>
     <p:sldId id="280" r:id="rId9"/>
     <p:sldId id="286" r:id="rId10"/>
     <p:sldId id="282" r:id="rId11"/>
-    <p:sldId id="283" r:id="rId12"/>
-    <p:sldId id="281" r:id="rId13"/>
-    <p:sldId id="285" r:id="rId14"/>
-    <p:sldId id="287" r:id="rId15"/>
+    <p:sldId id="288" r:id="rId12"/>
+    <p:sldId id="283" r:id="rId13"/>
+    <p:sldId id="281" r:id="rId14"/>
+    <p:sldId id="285" r:id="rId15"/>
+    <p:sldId id="287" r:id="rId16"/>
   </p:sldIdLst>
   <p:sldSz cx="12190413" cy="6858000"/>
   <p:notesSz cx="6858000" cy="9144000"/>
   <p:custDataLst>
-    <p:tags r:id="rId18"/>
+    <p:tags r:id="rId19"/>
   </p:custDataLst>
   <p:defaultTextStyle>
     <a:defPPr>
@@ -8823,7 +8824,7 @@
           <a:p>
             <a:r>
               <a:rPr lang="en-GB" sz="4800" dirty="0"/>
-              <a:t>Loads Forecasting using nacelle-based LiDAR</a:t>
+              <a:t>Loads and Power Forecasting using Nacelle-Based LiDAR</a:t>
             </a:r>
           </a:p>
           <a:p>
@@ -11724,7 +11725,7 @@
           <a:p>
             <a:r>
               <a:rPr lang="en-US" dirty="0"/>
-              <a:t>Feed Forward Neural Network</a:t>
+              <a:t>Understanding data correlation</a:t>
             </a:r>
             <a:endParaRPr lang="nl-NL" dirty="0"/>
           </a:p>
@@ -11760,119 +11761,12 @@
           </a:p>
         </p:txBody>
       </p:sp>
-      <p:pic>
-        <p:nvPicPr>
-          <p:cNvPr id="7" name="Content Placeholder 6" descr="A blue circle with white text&#10;&#10;Description automatically generated">
-            <a:extLst>
-              <a:ext uri="{FF2B5EF4-FFF2-40B4-BE49-F238E27FC236}">
-                <a16:creationId xmlns:a16="http://schemas.microsoft.com/office/drawing/2014/main" id="{1668C8C7-A633-5BE7-4F89-191AEABC0EA6}"/>
-              </a:ext>
-            </a:extLst>
-          </p:cNvPr>
-          <p:cNvPicPr>
-            <a:picLocks noGrp="1" noChangeAspect="1"/>
-          </p:cNvPicPr>
-          <p:nvPr>
-            <p:ph idx="1"/>
-          </p:nvPr>
-        </p:nvPicPr>
-        <p:blipFill>
-          <a:blip r:embed="rId2">
-            <a:extLst>
-              <a:ext uri="{28A0092B-C50C-407E-A947-70E740481C1C}">
-                <a14:useLocalDpi xmlns:a14="http://schemas.microsoft.com/office/drawing/2010/main" val="0"/>
-              </a:ext>
-            </a:extLst>
-          </a:blip>
-          <a:stretch>
-            <a:fillRect/>
-          </a:stretch>
-        </p:blipFill>
-        <p:spPr>
-          <a:xfrm>
-            <a:off x="6959302" y="188640"/>
-            <a:ext cx="5117460" cy="3326984"/>
-          </a:xfrm>
-        </p:spPr>
-      </p:pic>
-      <p:pic>
-        <p:nvPicPr>
-          <p:cNvPr id="11" name="Picture 10" descr="A graph with a red line and a blue line&#10;&#10;Description automatically generated">
-            <a:extLst>
-              <a:ext uri="{FF2B5EF4-FFF2-40B4-BE49-F238E27FC236}">
-                <a16:creationId xmlns:a16="http://schemas.microsoft.com/office/drawing/2014/main" id="{C6466C4F-0603-165E-DE0F-161CCC0B87FE}"/>
-              </a:ext>
-            </a:extLst>
-          </p:cNvPr>
-          <p:cNvPicPr>
-            <a:picLocks noChangeAspect="1"/>
-          </p:cNvPicPr>
-          <p:nvPr/>
-        </p:nvPicPr>
-        <p:blipFill>
-          <a:blip r:embed="rId3">
-            <a:extLst>
-              <a:ext uri="{28A0092B-C50C-407E-A947-70E740481C1C}">
-                <a14:useLocalDpi xmlns:a14="http://schemas.microsoft.com/office/drawing/2010/main" val="0"/>
-              </a:ext>
-            </a:extLst>
-          </a:blip>
-          <a:stretch>
-            <a:fillRect/>
-          </a:stretch>
-        </p:blipFill>
-        <p:spPr>
-          <a:xfrm>
-            <a:off x="7359995" y="3506867"/>
-            <a:ext cx="4166382" cy="2932289"/>
-          </a:xfrm>
-          <a:prstGeom prst="rect">
-            <a:avLst/>
-          </a:prstGeom>
-        </p:spPr>
-      </p:pic>
-      <p:pic>
-        <p:nvPicPr>
-          <p:cNvPr id="5" name="Picture 4" descr="A graph of a line&#10;&#10;Description automatically generated">
-            <a:extLst>
-              <a:ext uri="{FF2B5EF4-FFF2-40B4-BE49-F238E27FC236}">
-                <a16:creationId xmlns:a16="http://schemas.microsoft.com/office/drawing/2014/main" id="{978CBFA6-5662-9DC5-EFDB-50F88CD70E9A}"/>
-              </a:ext>
-            </a:extLst>
-          </p:cNvPr>
-          <p:cNvPicPr>
-            <a:picLocks noChangeAspect="1"/>
-          </p:cNvPicPr>
-          <p:nvPr/>
-        </p:nvPicPr>
-        <p:blipFill>
-          <a:blip r:embed="rId4">
-            <a:extLst>
-              <a:ext uri="{28A0092B-C50C-407E-A947-70E740481C1C}">
-                <a14:useLocalDpi xmlns:a14="http://schemas.microsoft.com/office/drawing/2010/main" val="0"/>
-              </a:ext>
-            </a:extLst>
-          </a:blip>
-          <a:stretch>
-            <a:fillRect/>
-          </a:stretch>
-        </p:blipFill>
-        <p:spPr>
-          <a:xfrm>
-            <a:off x="240634" y="1268759"/>
-            <a:ext cx="5782563" cy="3649047"/>
-          </a:xfrm>
-          <a:prstGeom prst="rect">
-            <a:avLst/>
-          </a:prstGeom>
-        </p:spPr>
-      </p:pic>
       <p:sp>
         <p:nvSpPr>
           <p:cNvPr id="3" name="Oval 2">
             <a:extLst>
               <a:ext uri="{FF2B5EF4-FFF2-40B4-BE49-F238E27FC236}">
-                <a16:creationId xmlns:a16="http://schemas.microsoft.com/office/drawing/2014/main" id="{A96E7AB0-9D22-3AA8-A3E3-B423A90AA276}"/>
+                <a16:creationId xmlns:a16="http://schemas.microsoft.com/office/drawing/2014/main" id="{17978B2B-E29A-F0E4-D62F-C7D92F726143}"/>
               </a:ext>
             </a:extLst>
           </p:cNvPr>
@@ -11939,10 +11833,10 @@
       </p:sp>
       <p:sp>
         <p:nvSpPr>
-          <p:cNvPr id="6" name="Oval 5">
-            <a:extLst>
-              <a:ext uri="{FF2B5EF4-FFF2-40B4-BE49-F238E27FC236}">
-                <a16:creationId xmlns:a16="http://schemas.microsoft.com/office/drawing/2014/main" id="{8521DB35-4ED7-CCE7-D1A6-D7696C1E3E3C}"/>
+          <p:cNvPr id="7" name="Oval 6">
+            <a:extLst>
+              <a:ext uri="{FF2B5EF4-FFF2-40B4-BE49-F238E27FC236}">
+                <a16:creationId xmlns:a16="http://schemas.microsoft.com/office/drawing/2014/main" id="{2BFE719F-80E4-DDEF-F2DD-5983174AF3B0}"/>
               </a:ext>
             </a:extLst>
           </p:cNvPr>
@@ -11957,7 +11851,9 @@
           <a:prstGeom prst="ellipse">
             <a:avLst/>
           </a:prstGeom>
-          <a:noFill/>
+          <a:solidFill>
+            <a:srgbClr val="990000"/>
+          </a:solidFill>
           <a:ln w="9525" cap="flat" cmpd="sng" algn="ctr">
             <a:solidFill>
               <a:schemeClr val="accent1"/>
@@ -12009,10 +11905,10 @@
       </p:sp>
       <p:sp>
         <p:nvSpPr>
-          <p:cNvPr id="8" name="Oval 7">
-            <a:extLst>
-              <a:ext uri="{FF2B5EF4-FFF2-40B4-BE49-F238E27FC236}">
-                <a16:creationId xmlns:a16="http://schemas.microsoft.com/office/drawing/2014/main" id="{7CF12460-665D-C26D-B29A-FC6745F31226}"/>
+          <p:cNvPr id="9" name="Oval 8">
+            <a:extLst>
+              <a:ext uri="{FF2B5EF4-FFF2-40B4-BE49-F238E27FC236}">
+                <a16:creationId xmlns:a16="http://schemas.microsoft.com/office/drawing/2014/main" id="{911680EF-7049-539D-19E0-34ACF0FFD8CD}"/>
               </a:ext>
             </a:extLst>
           </p:cNvPr>
@@ -12027,9 +11923,7 @@
           <a:prstGeom prst="ellipse">
             <a:avLst/>
           </a:prstGeom>
-          <a:solidFill>
-            <a:srgbClr val="990000"/>
-          </a:solidFill>
+          <a:noFill/>
           <a:ln w="9525" cap="flat" cmpd="sng" algn="ctr">
             <a:solidFill>
               <a:schemeClr val="accent1"/>
@@ -12081,10 +11975,10 @@
       </p:sp>
       <p:sp>
         <p:nvSpPr>
-          <p:cNvPr id="9" name="Oval 8">
-            <a:extLst>
-              <a:ext uri="{FF2B5EF4-FFF2-40B4-BE49-F238E27FC236}">
-                <a16:creationId xmlns:a16="http://schemas.microsoft.com/office/drawing/2014/main" id="{FEE2B377-821B-3197-60E4-55A99F2655DA}"/>
+          <p:cNvPr id="11" name="Oval 10">
+            <a:extLst>
+              <a:ext uri="{FF2B5EF4-FFF2-40B4-BE49-F238E27FC236}">
+                <a16:creationId xmlns:a16="http://schemas.microsoft.com/office/drawing/2014/main" id="{B05D8FCF-E3CE-19A8-12CF-5C82BC2C2545}"/>
               </a:ext>
             </a:extLst>
           </p:cNvPr>
@@ -12151,10 +12045,10 @@
       </p:sp>
       <p:sp>
         <p:nvSpPr>
-          <p:cNvPr id="10" name="Oval 9">
-            <a:extLst>
-              <a:ext uri="{FF2B5EF4-FFF2-40B4-BE49-F238E27FC236}">
-                <a16:creationId xmlns:a16="http://schemas.microsoft.com/office/drawing/2014/main" id="{57E42465-C05C-627A-DAA2-A4C677844CDB}"/>
+          <p:cNvPr id="12" name="Oval 11">
+            <a:extLst>
+              <a:ext uri="{FF2B5EF4-FFF2-40B4-BE49-F238E27FC236}">
+                <a16:creationId xmlns:a16="http://schemas.microsoft.com/office/drawing/2014/main" id="{22FCA865-047E-F702-FD4B-4940E664525B}"/>
               </a:ext>
             </a:extLst>
           </p:cNvPr>
@@ -12221,10 +12115,10 @@
       </p:sp>
       <p:sp>
         <p:nvSpPr>
-          <p:cNvPr id="12" name="Oval 11">
-            <a:extLst>
-              <a:ext uri="{FF2B5EF4-FFF2-40B4-BE49-F238E27FC236}">
-                <a16:creationId xmlns:a16="http://schemas.microsoft.com/office/drawing/2014/main" id="{298CE199-D5FA-1735-D10B-2CA392C542DF}"/>
+          <p:cNvPr id="13" name="Oval 12">
+            <a:extLst>
+              <a:ext uri="{FF2B5EF4-FFF2-40B4-BE49-F238E27FC236}">
+                <a16:creationId xmlns:a16="http://schemas.microsoft.com/office/drawing/2014/main" id="{0BF49241-6B7B-9BD0-88EA-F87D17B27A6B}"/>
               </a:ext>
             </a:extLst>
           </p:cNvPr>
@@ -12291,10 +12185,10 @@
       </p:sp>
       <p:sp>
         <p:nvSpPr>
-          <p:cNvPr id="13" name="TextBox 12">
-            <a:extLst>
-              <a:ext uri="{FF2B5EF4-FFF2-40B4-BE49-F238E27FC236}">
-                <a16:creationId xmlns:a16="http://schemas.microsoft.com/office/drawing/2014/main" id="{363B2F3C-3EC3-6A6B-D561-221AE3D85088}"/>
+          <p:cNvPr id="14" name="TextBox 13">
+            <a:extLst>
+              <a:ext uri="{FF2B5EF4-FFF2-40B4-BE49-F238E27FC236}">
+                <a16:creationId xmlns:a16="http://schemas.microsoft.com/office/drawing/2014/main" id="{D05A7D33-B2DB-EEAC-F784-654073945E96}"/>
               </a:ext>
             </a:extLst>
           </p:cNvPr>
@@ -12342,10 +12236,10 @@
       </p:sp>
       <p:sp>
         <p:nvSpPr>
-          <p:cNvPr id="14" name="TextBox 13">
-            <a:extLst>
-              <a:ext uri="{FF2B5EF4-FFF2-40B4-BE49-F238E27FC236}">
-                <a16:creationId xmlns:a16="http://schemas.microsoft.com/office/drawing/2014/main" id="{AA875649-3972-CDF7-E039-8420370BA651}"/>
+          <p:cNvPr id="15" name="TextBox 14">
+            <a:extLst>
+              <a:ext uri="{FF2B5EF4-FFF2-40B4-BE49-F238E27FC236}">
+                <a16:creationId xmlns:a16="http://schemas.microsoft.com/office/drawing/2014/main" id="{EE5F2507-81BD-65B8-FE05-6E86DFC5CB78}"/>
               </a:ext>
             </a:extLst>
           </p:cNvPr>
@@ -12393,10 +12287,10 @@
       </p:sp>
       <p:sp>
         <p:nvSpPr>
-          <p:cNvPr id="15" name="TextBox 14">
-            <a:extLst>
-              <a:ext uri="{FF2B5EF4-FFF2-40B4-BE49-F238E27FC236}">
-                <a16:creationId xmlns:a16="http://schemas.microsoft.com/office/drawing/2014/main" id="{7D3CF538-81CA-96E2-D188-A1247C82DDB9}"/>
+          <p:cNvPr id="16" name="TextBox 15">
+            <a:extLst>
+              <a:ext uri="{FF2B5EF4-FFF2-40B4-BE49-F238E27FC236}">
+                <a16:creationId xmlns:a16="http://schemas.microsoft.com/office/drawing/2014/main" id="{902F75CF-4555-E2DB-7519-E33FF4670C70}"/>
               </a:ext>
             </a:extLst>
           </p:cNvPr>
@@ -12444,10 +12338,10 @@
       </p:sp>
       <p:sp>
         <p:nvSpPr>
-          <p:cNvPr id="16" name="TextBox 15">
-            <a:extLst>
-              <a:ext uri="{FF2B5EF4-FFF2-40B4-BE49-F238E27FC236}">
-                <a16:creationId xmlns:a16="http://schemas.microsoft.com/office/drawing/2014/main" id="{1B1673EB-08DB-8628-C310-CB479D96A776}"/>
+          <p:cNvPr id="17" name="TextBox 16">
+            <a:extLst>
+              <a:ext uri="{FF2B5EF4-FFF2-40B4-BE49-F238E27FC236}">
+                <a16:creationId xmlns:a16="http://schemas.microsoft.com/office/drawing/2014/main" id="{3C0BFFEC-6A3F-D6C9-9FD7-542FD36AB121}"/>
               </a:ext>
             </a:extLst>
           </p:cNvPr>
@@ -12495,10 +12389,10 @@
       </p:sp>
       <p:sp>
         <p:nvSpPr>
-          <p:cNvPr id="17" name="TextBox 16">
-            <a:extLst>
-              <a:ext uri="{FF2B5EF4-FFF2-40B4-BE49-F238E27FC236}">
-                <a16:creationId xmlns:a16="http://schemas.microsoft.com/office/drawing/2014/main" id="{637D7D33-671C-63C3-81B9-341E2A6FD8BC}"/>
+          <p:cNvPr id="18" name="TextBox 17">
+            <a:extLst>
+              <a:ext uri="{FF2B5EF4-FFF2-40B4-BE49-F238E27FC236}">
+                <a16:creationId xmlns:a16="http://schemas.microsoft.com/office/drawing/2014/main" id="{ACA8C759-532A-4892-3582-F30722B60E08}"/>
               </a:ext>
             </a:extLst>
           </p:cNvPr>
@@ -12546,10 +12440,10 @@
       </p:sp>
       <p:sp>
         <p:nvSpPr>
-          <p:cNvPr id="18" name="TextBox 17">
-            <a:extLst>
-              <a:ext uri="{FF2B5EF4-FFF2-40B4-BE49-F238E27FC236}">
-                <a16:creationId xmlns:a16="http://schemas.microsoft.com/office/drawing/2014/main" id="{02A66749-E3BC-8D58-3947-ACD80CB36568}"/>
+          <p:cNvPr id="19" name="TextBox 18">
+            <a:extLst>
+              <a:ext uri="{FF2B5EF4-FFF2-40B4-BE49-F238E27FC236}">
+                <a16:creationId xmlns:a16="http://schemas.microsoft.com/office/drawing/2014/main" id="{FFDFBF4E-AA1E-5145-ED6F-B3BAA93702F8}"/>
               </a:ext>
             </a:extLst>
           </p:cNvPr>
@@ -12595,10 +12489,81 @@
           </a:p>
         </p:txBody>
       </p:sp>
+      <p:pic>
+        <p:nvPicPr>
+          <p:cNvPr id="22" name="Content Placeholder 21" descr="A screenshot of a graph&#10;&#10;Description automatically generated">
+            <a:extLst>
+              <a:ext uri="{FF2B5EF4-FFF2-40B4-BE49-F238E27FC236}">
+                <a16:creationId xmlns:a16="http://schemas.microsoft.com/office/drawing/2014/main" id="{3CE53A2B-1A67-FB7B-5B4F-BEBF8691852A}"/>
+              </a:ext>
+            </a:extLst>
+          </p:cNvPr>
+          <p:cNvPicPr>
+            <a:picLocks noGrp="1" noChangeAspect="1"/>
+          </p:cNvPicPr>
+          <p:nvPr>
+            <p:ph idx="1"/>
+          </p:nvPr>
+        </p:nvPicPr>
+        <p:blipFill>
+          <a:blip r:embed="rId2">
+            <a:extLst>
+              <a:ext uri="{28A0092B-C50C-407E-A947-70E740481C1C}">
+                <a14:useLocalDpi xmlns:a14="http://schemas.microsoft.com/office/drawing/2010/main" val="0"/>
+              </a:ext>
+            </a:extLst>
+          </a:blip>
+          <a:stretch>
+            <a:fillRect/>
+          </a:stretch>
+        </p:blipFill>
+        <p:spPr>
+          <a:xfrm>
+            <a:off x="6970498" y="692696"/>
+            <a:ext cx="4968552" cy="4968552"/>
+          </a:xfrm>
+        </p:spPr>
+      </p:pic>
+      <p:pic>
+        <p:nvPicPr>
+          <p:cNvPr id="24" name="Picture 23" descr="A chart of a diagram&#10;&#10;Description automatically generated with medium confidence">
+            <a:extLst>
+              <a:ext uri="{FF2B5EF4-FFF2-40B4-BE49-F238E27FC236}">
+                <a16:creationId xmlns:a16="http://schemas.microsoft.com/office/drawing/2014/main" id="{0B1FA845-320F-F1C9-2AC7-9A5AE4313E15}"/>
+              </a:ext>
+            </a:extLst>
+          </p:cNvPr>
+          <p:cNvPicPr>
+            <a:picLocks noChangeAspect="1"/>
+          </p:cNvPicPr>
+          <p:nvPr/>
+        </p:nvPicPr>
+        <p:blipFill>
+          <a:blip r:embed="rId3">
+            <a:extLst>
+              <a:ext uri="{28A0092B-C50C-407E-A947-70E740481C1C}">
+                <a14:useLocalDpi xmlns:a14="http://schemas.microsoft.com/office/drawing/2010/main" val="0"/>
+              </a:ext>
+            </a:extLst>
+          </a:blip>
+          <a:stretch>
+            <a:fillRect/>
+          </a:stretch>
+        </p:blipFill>
+        <p:spPr>
+          <a:xfrm>
+            <a:off x="1155948" y="907097"/>
+            <a:ext cx="4725144" cy="4725144"/>
+          </a:xfrm>
+          <a:prstGeom prst="rect">
+            <a:avLst/>
+          </a:prstGeom>
+        </p:spPr>
+      </p:pic>
     </p:spTree>
     <p:extLst>
       <p:ext uri="{BB962C8B-B14F-4D97-AF65-F5344CB8AC3E}">
-        <p14:creationId xmlns:p14="http://schemas.microsoft.com/office/powerpoint/2010/main" val="3173100887"/>
+        <p14:creationId xmlns:p14="http://schemas.microsoft.com/office/powerpoint/2010/main" val="1866519356"/>
       </p:ext>
     </p:extLst>
   </p:cSld>
@@ -12630,6 +12595,930 @@
           <p:cNvPr id="2" name="Title 1">
             <a:extLst>
               <a:ext uri="{FF2B5EF4-FFF2-40B4-BE49-F238E27FC236}">
+                <a16:creationId xmlns:a16="http://schemas.microsoft.com/office/drawing/2014/main" id="{8CFF9C99-D02F-A665-2773-861D9B140310}"/>
+              </a:ext>
+            </a:extLst>
+          </p:cNvPr>
+          <p:cNvSpPr>
+            <a:spLocks noGrp="1"/>
+          </p:cNvSpPr>
+          <p:nvPr>
+            <p:ph type="title"/>
+          </p:nvPr>
+        </p:nvSpPr>
+        <p:spPr/>
+        <p:txBody>
+          <a:bodyPr/>
+          <a:lstStyle/>
+          <a:p>
+            <a:r>
+              <a:rPr lang="en-US" dirty="0"/>
+              <a:t>Feed Forward Neural Network</a:t>
+            </a:r>
+            <a:endParaRPr lang="nl-NL" dirty="0"/>
+          </a:p>
+        </p:txBody>
+      </p:sp>
+      <p:sp>
+        <p:nvSpPr>
+          <p:cNvPr id="4" name="Slide Number Placeholder 3">
+            <a:extLst>
+              <a:ext uri="{FF2B5EF4-FFF2-40B4-BE49-F238E27FC236}">
+                <a16:creationId xmlns:a16="http://schemas.microsoft.com/office/drawing/2014/main" id="{B58826FE-22C3-8103-499A-C05D66B01C1B}"/>
+              </a:ext>
+            </a:extLst>
+          </p:cNvPr>
+          <p:cNvSpPr>
+            <a:spLocks noGrp="1"/>
+          </p:cNvSpPr>
+          <p:nvPr>
+            <p:ph type="sldNum" sz="quarter" idx="11"/>
+          </p:nvPr>
+        </p:nvSpPr>
+        <p:spPr/>
+        <p:txBody>
+          <a:bodyPr/>
+          <a:lstStyle/>
+          <a:p>
+            <a:fld id="{103EA872-A674-449B-A120-B97244F8E91D}" type="slidenum">
+              <a:rPr lang="en-GB" smtClean="0"/>
+              <a:pPr/>
+              <a:t>6</a:t>
+            </a:fld>
+            <a:endParaRPr lang="en-GB" dirty="0"/>
+          </a:p>
+        </p:txBody>
+      </p:sp>
+      <p:pic>
+        <p:nvPicPr>
+          <p:cNvPr id="7" name="Content Placeholder 6" descr="A blue circle with white text&#10;&#10;Description automatically generated">
+            <a:extLst>
+              <a:ext uri="{FF2B5EF4-FFF2-40B4-BE49-F238E27FC236}">
+                <a16:creationId xmlns:a16="http://schemas.microsoft.com/office/drawing/2014/main" id="{1668C8C7-A633-5BE7-4F89-191AEABC0EA6}"/>
+              </a:ext>
+            </a:extLst>
+          </p:cNvPr>
+          <p:cNvPicPr>
+            <a:picLocks noGrp="1" noChangeAspect="1"/>
+          </p:cNvPicPr>
+          <p:nvPr>
+            <p:ph idx="1"/>
+          </p:nvPr>
+        </p:nvPicPr>
+        <p:blipFill>
+          <a:blip r:embed="rId2">
+            <a:extLst>
+              <a:ext uri="{28A0092B-C50C-407E-A947-70E740481C1C}">
+                <a14:useLocalDpi xmlns:a14="http://schemas.microsoft.com/office/drawing/2010/main" val="0"/>
+              </a:ext>
+            </a:extLst>
+          </a:blip>
+          <a:stretch>
+            <a:fillRect/>
+          </a:stretch>
+        </p:blipFill>
+        <p:spPr>
+          <a:xfrm>
+            <a:off x="6959302" y="188640"/>
+            <a:ext cx="5117460" cy="3326984"/>
+          </a:xfrm>
+        </p:spPr>
+      </p:pic>
+      <p:pic>
+        <p:nvPicPr>
+          <p:cNvPr id="11" name="Picture 10" descr="A graph with a red line and a blue line&#10;&#10;Description automatically generated">
+            <a:extLst>
+              <a:ext uri="{FF2B5EF4-FFF2-40B4-BE49-F238E27FC236}">
+                <a16:creationId xmlns:a16="http://schemas.microsoft.com/office/drawing/2014/main" id="{C6466C4F-0603-165E-DE0F-161CCC0B87FE}"/>
+              </a:ext>
+            </a:extLst>
+          </p:cNvPr>
+          <p:cNvPicPr>
+            <a:picLocks noChangeAspect="1"/>
+          </p:cNvPicPr>
+          <p:nvPr/>
+        </p:nvPicPr>
+        <p:blipFill>
+          <a:blip r:embed="rId3">
+            <a:extLst>
+              <a:ext uri="{28A0092B-C50C-407E-A947-70E740481C1C}">
+                <a14:useLocalDpi xmlns:a14="http://schemas.microsoft.com/office/drawing/2010/main" val="0"/>
+              </a:ext>
+            </a:extLst>
+          </a:blip>
+          <a:stretch>
+            <a:fillRect/>
+          </a:stretch>
+        </p:blipFill>
+        <p:spPr>
+          <a:xfrm>
+            <a:off x="7359995" y="3506867"/>
+            <a:ext cx="4166382" cy="2932289"/>
+          </a:xfrm>
+          <a:prstGeom prst="rect">
+            <a:avLst/>
+          </a:prstGeom>
+        </p:spPr>
+      </p:pic>
+      <p:pic>
+        <p:nvPicPr>
+          <p:cNvPr id="5" name="Picture 4" descr="A graph of a line&#10;&#10;Description automatically generated">
+            <a:extLst>
+              <a:ext uri="{FF2B5EF4-FFF2-40B4-BE49-F238E27FC236}">
+                <a16:creationId xmlns:a16="http://schemas.microsoft.com/office/drawing/2014/main" id="{978CBFA6-5662-9DC5-EFDB-50F88CD70E9A}"/>
+              </a:ext>
+            </a:extLst>
+          </p:cNvPr>
+          <p:cNvPicPr>
+            <a:picLocks noChangeAspect="1"/>
+          </p:cNvPicPr>
+          <p:nvPr/>
+        </p:nvPicPr>
+        <p:blipFill>
+          <a:blip r:embed="rId4">
+            <a:extLst>
+              <a:ext uri="{28A0092B-C50C-407E-A947-70E740481C1C}">
+                <a14:useLocalDpi xmlns:a14="http://schemas.microsoft.com/office/drawing/2010/main" val="0"/>
+              </a:ext>
+            </a:extLst>
+          </a:blip>
+          <a:stretch>
+            <a:fillRect/>
+          </a:stretch>
+        </p:blipFill>
+        <p:spPr>
+          <a:xfrm>
+            <a:off x="240634" y="1268759"/>
+            <a:ext cx="5782563" cy="3649047"/>
+          </a:xfrm>
+          <a:prstGeom prst="rect">
+            <a:avLst/>
+          </a:prstGeom>
+        </p:spPr>
+      </p:pic>
+      <p:sp>
+        <p:nvSpPr>
+          <p:cNvPr id="3" name="Oval 2">
+            <a:extLst>
+              <a:ext uri="{FF2B5EF4-FFF2-40B4-BE49-F238E27FC236}">
+                <a16:creationId xmlns:a16="http://schemas.microsoft.com/office/drawing/2014/main" id="{A96E7AB0-9D22-3AA8-A3E3-B423A90AA276}"/>
+              </a:ext>
+            </a:extLst>
+          </p:cNvPr>
+          <p:cNvSpPr/>
+          <p:nvPr/>
+        </p:nvSpPr>
+        <p:spPr bwMode="auto">
+          <a:xfrm>
+            <a:off x="1270670" y="5661248"/>
+            <a:ext cx="288032" cy="288032"/>
+          </a:xfrm>
+          <a:prstGeom prst="ellipse">
+            <a:avLst/>
+          </a:prstGeom>
+          <a:noFill/>
+          <a:ln w="9525" cap="flat" cmpd="sng" algn="ctr">
+            <a:solidFill>
+              <a:schemeClr val="accent1"/>
+            </a:solidFill>
+            <a:prstDash val="solid"/>
+            <a:miter lim="800000"/>
+            <a:headEnd type="none" w="med" len="med"/>
+            <a:tailEnd type="none" w="med" len="med"/>
+          </a:ln>
+          <a:effectLst/>
+        </p:spPr>
+        <p:txBody>
+          <a:bodyPr vert="horz" wrap="square" lIns="90000" tIns="46800" rIns="90000" bIns="46800" numCol="1" rtlCol="0" anchor="ctr" anchorCtr="0" compatLnSpc="1">
+            <a:prstTxWarp prst="textNoShape">
+              <a:avLst/>
+            </a:prstTxWarp>
+          </a:bodyPr>
+          <a:lstStyle/>
+          <a:p>
+            <a:pPr marL="0" marR="0" indent="0" algn="ctr" defTabSz="914400" rtl="0" eaLnBrk="1" fontAlgn="base" latinLnBrk="0" hangingPunct="1">
+              <a:lnSpc>
+                <a:spcPct val="100000"/>
+              </a:lnSpc>
+              <a:spcBef>
+                <a:spcPts val="432"/>
+              </a:spcBef>
+              <a:spcAft>
+                <a:spcPct val="0"/>
+              </a:spcAft>
+              <a:buClrTx/>
+              <a:buSzTx/>
+              <a:buFontTx/>
+              <a:buNone/>
+              <a:tabLst/>
+            </a:pPr>
+            <a:endParaRPr kumimoji="0" lang="nl-NL" sz="1600" b="0" i="0" u="none" strike="noStrike" cap="none" normalizeH="0" baseline="0" dirty="0" err="1">
+              <a:ln>
+                <a:noFill/>
+              </a:ln>
+              <a:solidFill>
+                <a:srgbClr val="FFFFFF"/>
+              </a:solidFill>
+              <a:effectLst/>
+              <a:latin typeface="+mn-lt"/>
+              <a:ea typeface="ＭＳ Ｐゴシック" pitchFamily="-80" charset="-128"/>
+            </a:endParaRPr>
+          </a:p>
+        </p:txBody>
+      </p:sp>
+      <p:sp>
+        <p:nvSpPr>
+          <p:cNvPr id="6" name="Oval 5">
+            <a:extLst>
+              <a:ext uri="{FF2B5EF4-FFF2-40B4-BE49-F238E27FC236}">
+                <a16:creationId xmlns:a16="http://schemas.microsoft.com/office/drawing/2014/main" id="{8521DB35-4ED7-CCE7-D1A6-D7696C1E3E3C}"/>
+              </a:ext>
+            </a:extLst>
+          </p:cNvPr>
+          <p:cNvSpPr/>
+          <p:nvPr/>
+        </p:nvSpPr>
+        <p:spPr bwMode="auto">
+          <a:xfrm>
+            <a:off x="2422798" y="5661248"/>
+            <a:ext cx="288032" cy="288032"/>
+          </a:xfrm>
+          <a:prstGeom prst="ellipse">
+            <a:avLst/>
+          </a:prstGeom>
+          <a:noFill/>
+          <a:ln w="9525" cap="flat" cmpd="sng" algn="ctr">
+            <a:solidFill>
+              <a:schemeClr val="accent1"/>
+            </a:solidFill>
+            <a:prstDash val="solid"/>
+            <a:miter lim="800000"/>
+            <a:headEnd type="none" w="med" len="med"/>
+            <a:tailEnd type="none" w="med" len="med"/>
+          </a:ln>
+          <a:effectLst/>
+        </p:spPr>
+        <p:txBody>
+          <a:bodyPr vert="horz" wrap="square" lIns="90000" tIns="46800" rIns="90000" bIns="46800" numCol="1" rtlCol="0" anchor="ctr" anchorCtr="0" compatLnSpc="1">
+            <a:prstTxWarp prst="textNoShape">
+              <a:avLst/>
+            </a:prstTxWarp>
+          </a:bodyPr>
+          <a:lstStyle/>
+          <a:p>
+            <a:pPr marL="0" marR="0" indent="0" algn="ctr" defTabSz="914400" rtl="0" eaLnBrk="1" fontAlgn="base" latinLnBrk="0" hangingPunct="1">
+              <a:lnSpc>
+                <a:spcPct val="100000"/>
+              </a:lnSpc>
+              <a:spcBef>
+                <a:spcPts val="432"/>
+              </a:spcBef>
+              <a:spcAft>
+                <a:spcPct val="0"/>
+              </a:spcAft>
+              <a:buClrTx/>
+              <a:buSzTx/>
+              <a:buFontTx/>
+              <a:buNone/>
+              <a:tabLst/>
+            </a:pPr>
+            <a:endParaRPr kumimoji="0" lang="nl-NL" sz="1600" b="0" i="0" u="none" strike="noStrike" cap="none" normalizeH="0" baseline="0" dirty="0" err="1">
+              <a:ln>
+                <a:noFill/>
+              </a:ln>
+              <a:solidFill>
+                <a:srgbClr val="FFFFFF"/>
+              </a:solidFill>
+              <a:effectLst/>
+              <a:latin typeface="+mn-lt"/>
+              <a:ea typeface="ＭＳ Ｐゴシック" pitchFamily="-80" charset="-128"/>
+            </a:endParaRPr>
+          </a:p>
+        </p:txBody>
+      </p:sp>
+      <p:sp>
+        <p:nvSpPr>
+          <p:cNvPr id="8" name="Oval 7">
+            <a:extLst>
+              <a:ext uri="{FF2B5EF4-FFF2-40B4-BE49-F238E27FC236}">
+                <a16:creationId xmlns:a16="http://schemas.microsoft.com/office/drawing/2014/main" id="{7CF12460-665D-C26D-B29A-FC6745F31226}"/>
+              </a:ext>
+            </a:extLst>
+          </p:cNvPr>
+          <p:cNvSpPr/>
+          <p:nvPr/>
+        </p:nvSpPr>
+        <p:spPr bwMode="auto">
+          <a:xfrm>
+            <a:off x="3574926" y="5661248"/>
+            <a:ext cx="288032" cy="288032"/>
+          </a:xfrm>
+          <a:prstGeom prst="ellipse">
+            <a:avLst/>
+          </a:prstGeom>
+          <a:solidFill>
+            <a:srgbClr val="990000"/>
+          </a:solidFill>
+          <a:ln w="9525" cap="flat" cmpd="sng" algn="ctr">
+            <a:solidFill>
+              <a:schemeClr val="accent1"/>
+            </a:solidFill>
+            <a:prstDash val="solid"/>
+            <a:miter lim="800000"/>
+            <a:headEnd type="none" w="med" len="med"/>
+            <a:tailEnd type="none" w="med" len="med"/>
+          </a:ln>
+          <a:effectLst/>
+        </p:spPr>
+        <p:txBody>
+          <a:bodyPr vert="horz" wrap="square" lIns="90000" tIns="46800" rIns="90000" bIns="46800" numCol="1" rtlCol="0" anchor="ctr" anchorCtr="0" compatLnSpc="1">
+            <a:prstTxWarp prst="textNoShape">
+              <a:avLst/>
+            </a:prstTxWarp>
+          </a:bodyPr>
+          <a:lstStyle/>
+          <a:p>
+            <a:pPr marL="0" marR="0" indent="0" algn="ctr" defTabSz="914400" rtl="0" eaLnBrk="1" fontAlgn="base" latinLnBrk="0" hangingPunct="1">
+              <a:lnSpc>
+                <a:spcPct val="100000"/>
+              </a:lnSpc>
+              <a:spcBef>
+                <a:spcPts val="432"/>
+              </a:spcBef>
+              <a:spcAft>
+                <a:spcPct val="0"/>
+              </a:spcAft>
+              <a:buClrTx/>
+              <a:buSzTx/>
+              <a:buFontTx/>
+              <a:buNone/>
+              <a:tabLst/>
+            </a:pPr>
+            <a:endParaRPr kumimoji="0" lang="nl-NL" sz="1600" b="0" i="0" u="none" strike="noStrike" cap="none" normalizeH="0" baseline="0" dirty="0" err="1">
+              <a:ln>
+                <a:noFill/>
+              </a:ln>
+              <a:solidFill>
+                <a:srgbClr val="FFFFFF"/>
+              </a:solidFill>
+              <a:effectLst/>
+              <a:latin typeface="+mn-lt"/>
+              <a:ea typeface="ＭＳ Ｐゴシック" pitchFamily="-80" charset="-128"/>
+            </a:endParaRPr>
+          </a:p>
+        </p:txBody>
+      </p:sp>
+      <p:sp>
+        <p:nvSpPr>
+          <p:cNvPr id="9" name="Oval 8">
+            <a:extLst>
+              <a:ext uri="{FF2B5EF4-FFF2-40B4-BE49-F238E27FC236}">
+                <a16:creationId xmlns:a16="http://schemas.microsoft.com/office/drawing/2014/main" id="{FEE2B377-821B-3197-60E4-55A99F2655DA}"/>
+              </a:ext>
+            </a:extLst>
+          </p:cNvPr>
+          <p:cNvSpPr/>
+          <p:nvPr/>
+        </p:nvSpPr>
+        <p:spPr bwMode="auto">
+          <a:xfrm>
+            <a:off x="4728964" y="5662871"/>
+            <a:ext cx="288032" cy="288032"/>
+          </a:xfrm>
+          <a:prstGeom prst="ellipse">
+            <a:avLst/>
+          </a:prstGeom>
+          <a:noFill/>
+          <a:ln w="9525" cap="flat" cmpd="sng" algn="ctr">
+            <a:solidFill>
+              <a:schemeClr val="accent1"/>
+            </a:solidFill>
+            <a:prstDash val="solid"/>
+            <a:miter lim="800000"/>
+            <a:headEnd type="none" w="med" len="med"/>
+            <a:tailEnd type="none" w="med" len="med"/>
+          </a:ln>
+          <a:effectLst/>
+        </p:spPr>
+        <p:txBody>
+          <a:bodyPr vert="horz" wrap="square" lIns="90000" tIns="46800" rIns="90000" bIns="46800" numCol="1" rtlCol="0" anchor="ctr" anchorCtr="0" compatLnSpc="1">
+            <a:prstTxWarp prst="textNoShape">
+              <a:avLst/>
+            </a:prstTxWarp>
+          </a:bodyPr>
+          <a:lstStyle/>
+          <a:p>
+            <a:pPr marL="0" marR="0" indent="0" algn="ctr" defTabSz="914400" rtl="0" eaLnBrk="1" fontAlgn="base" latinLnBrk="0" hangingPunct="1">
+              <a:lnSpc>
+                <a:spcPct val="100000"/>
+              </a:lnSpc>
+              <a:spcBef>
+                <a:spcPts val="432"/>
+              </a:spcBef>
+              <a:spcAft>
+                <a:spcPct val="0"/>
+              </a:spcAft>
+              <a:buClrTx/>
+              <a:buSzTx/>
+              <a:buFontTx/>
+              <a:buNone/>
+              <a:tabLst/>
+            </a:pPr>
+            <a:endParaRPr kumimoji="0" lang="nl-NL" sz="1600" b="0" i="0" u="none" strike="noStrike" cap="none" normalizeH="0" baseline="0" dirty="0" err="1">
+              <a:ln>
+                <a:noFill/>
+              </a:ln>
+              <a:solidFill>
+                <a:srgbClr val="FFFFFF"/>
+              </a:solidFill>
+              <a:effectLst/>
+              <a:latin typeface="+mn-lt"/>
+              <a:ea typeface="ＭＳ Ｐゴシック" pitchFamily="-80" charset="-128"/>
+            </a:endParaRPr>
+          </a:p>
+        </p:txBody>
+      </p:sp>
+      <p:sp>
+        <p:nvSpPr>
+          <p:cNvPr id="10" name="Oval 9">
+            <a:extLst>
+              <a:ext uri="{FF2B5EF4-FFF2-40B4-BE49-F238E27FC236}">
+                <a16:creationId xmlns:a16="http://schemas.microsoft.com/office/drawing/2014/main" id="{57E42465-C05C-627A-DAA2-A4C677844CDB}"/>
+              </a:ext>
+            </a:extLst>
+          </p:cNvPr>
+          <p:cNvSpPr/>
+          <p:nvPr/>
+        </p:nvSpPr>
+        <p:spPr bwMode="auto">
+          <a:xfrm>
+            <a:off x="5881092" y="5661248"/>
+            <a:ext cx="288032" cy="288032"/>
+          </a:xfrm>
+          <a:prstGeom prst="ellipse">
+            <a:avLst/>
+          </a:prstGeom>
+          <a:noFill/>
+          <a:ln w="9525" cap="flat" cmpd="sng" algn="ctr">
+            <a:solidFill>
+              <a:schemeClr val="accent1"/>
+            </a:solidFill>
+            <a:prstDash val="solid"/>
+            <a:miter lim="800000"/>
+            <a:headEnd type="none" w="med" len="med"/>
+            <a:tailEnd type="none" w="med" len="med"/>
+          </a:ln>
+          <a:effectLst/>
+        </p:spPr>
+        <p:txBody>
+          <a:bodyPr vert="horz" wrap="square" lIns="90000" tIns="46800" rIns="90000" bIns="46800" numCol="1" rtlCol="0" anchor="ctr" anchorCtr="0" compatLnSpc="1">
+            <a:prstTxWarp prst="textNoShape">
+              <a:avLst/>
+            </a:prstTxWarp>
+          </a:bodyPr>
+          <a:lstStyle/>
+          <a:p>
+            <a:pPr marL="0" marR="0" indent="0" algn="ctr" defTabSz="914400" rtl="0" eaLnBrk="1" fontAlgn="base" latinLnBrk="0" hangingPunct="1">
+              <a:lnSpc>
+                <a:spcPct val="100000"/>
+              </a:lnSpc>
+              <a:spcBef>
+                <a:spcPts val="432"/>
+              </a:spcBef>
+              <a:spcAft>
+                <a:spcPct val="0"/>
+              </a:spcAft>
+              <a:buClrTx/>
+              <a:buSzTx/>
+              <a:buFontTx/>
+              <a:buNone/>
+              <a:tabLst/>
+            </a:pPr>
+            <a:endParaRPr kumimoji="0" lang="nl-NL" sz="1600" b="0" i="0" u="none" strike="noStrike" cap="none" normalizeH="0" baseline="0" dirty="0" err="1">
+              <a:ln>
+                <a:noFill/>
+              </a:ln>
+              <a:solidFill>
+                <a:srgbClr val="FFFFFF"/>
+              </a:solidFill>
+              <a:effectLst/>
+              <a:latin typeface="+mn-lt"/>
+              <a:ea typeface="ＭＳ Ｐゴシック" pitchFamily="-80" charset="-128"/>
+            </a:endParaRPr>
+          </a:p>
+        </p:txBody>
+      </p:sp>
+      <p:sp>
+        <p:nvSpPr>
+          <p:cNvPr id="12" name="Oval 11">
+            <a:extLst>
+              <a:ext uri="{FF2B5EF4-FFF2-40B4-BE49-F238E27FC236}">
+                <a16:creationId xmlns:a16="http://schemas.microsoft.com/office/drawing/2014/main" id="{298CE199-D5FA-1735-D10B-2CA392C542DF}"/>
+              </a:ext>
+            </a:extLst>
+          </p:cNvPr>
+          <p:cNvSpPr/>
+          <p:nvPr/>
+        </p:nvSpPr>
+        <p:spPr bwMode="auto">
+          <a:xfrm>
+            <a:off x="7033220" y="5662871"/>
+            <a:ext cx="288032" cy="288032"/>
+          </a:xfrm>
+          <a:prstGeom prst="ellipse">
+            <a:avLst/>
+          </a:prstGeom>
+          <a:noFill/>
+          <a:ln w="9525" cap="flat" cmpd="sng" algn="ctr">
+            <a:solidFill>
+              <a:schemeClr val="accent1"/>
+            </a:solidFill>
+            <a:prstDash val="solid"/>
+            <a:miter lim="800000"/>
+            <a:headEnd type="none" w="med" len="med"/>
+            <a:tailEnd type="none" w="med" len="med"/>
+          </a:ln>
+          <a:effectLst/>
+        </p:spPr>
+        <p:txBody>
+          <a:bodyPr vert="horz" wrap="square" lIns="90000" tIns="46800" rIns="90000" bIns="46800" numCol="1" rtlCol="0" anchor="ctr" anchorCtr="0" compatLnSpc="1">
+            <a:prstTxWarp prst="textNoShape">
+              <a:avLst/>
+            </a:prstTxWarp>
+          </a:bodyPr>
+          <a:lstStyle/>
+          <a:p>
+            <a:pPr marL="0" marR="0" indent="0" algn="ctr" defTabSz="914400" rtl="0" eaLnBrk="1" fontAlgn="base" latinLnBrk="0" hangingPunct="1">
+              <a:lnSpc>
+                <a:spcPct val="100000"/>
+              </a:lnSpc>
+              <a:spcBef>
+                <a:spcPts val="432"/>
+              </a:spcBef>
+              <a:spcAft>
+                <a:spcPct val="0"/>
+              </a:spcAft>
+              <a:buClrTx/>
+              <a:buSzTx/>
+              <a:buFontTx/>
+              <a:buNone/>
+              <a:tabLst/>
+            </a:pPr>
+            <a:endParaRPr kumimoji="0" lang="nl-NL" sz="1600" b="0" i="0" u="none" strike="noStrike" cap="none" normalizeH="0" baseline="0" dirty="0" err="1">
+              <a:ln>
+                <a:noFill/>
+              </a:ln>
+              <a:solidFill>
+                <a:srgbClr val="FFFFFF"/>
+              </a:solidFill>
+              <a:effectLst/>
+              <a:latin typeface="+mn-lt"/>
+              <a:ea typeface="ＭＳ Ｐゴシック" pitchFamily="-80" charset="-128"/>
+            </a:endParaRPr>
+          </a:p>
+        </p:txBody>
+      </p:sp>
+      <p:sp>
+        <p:nvSpPr>
+          <p:cNvPr id="13" name="TextBox 12">
+            <a:extLst>
+              <a:ext uri="{FF2B5EF4-FFF2-40B4-BE49-F238E27FC236}">
+                <a16:creationId xmlns:a16="http://schemas.microsoft.com/office/drawing/2014/main" id="{363B2F3C-3EC3-6A6B-D561-221AE3D85088}"/>
+              </a:ext>
+            </a:extLst>
+          </p:cNvPr>
+          <p:cNvSpPr txBox="1"/>
+          <p:nvPr/>
+        </p:nvSpPr>
+        <p:spPr>
+          <a:xfrm>
+            <a:off x="1054646" y="6075041"/>
+            <a:ext cx="720080" cy="246221"/>
+          </a:xfrm>
+          <a:prstGeom prst="rect">
+            <a:avLst/>
+          </a:prstGeom>
+          <a:noFill/>
+        </p:spPr>
+        <p:txBody>
+          <a:bodyPr wrap="square" lIns="0" tIns="0" rIns="0" bIns="0" rtlCol="0">
+            <a:spAutoFit/>
+          </a:bodyPr>
+          <a:lstStyle/>
+          <a:p>
+            <a:pPr algn="ctr">
+              <a:spcBef>
+                <a:spcPts val="432"/>
+              </a:spcBef>
+            </a:pPr>
+            <a:r>
+              <a:rPr lang="en-US" dirty="0">
+                <a:solidFill>
+                  <a:srgbClr val="990000"/>
+                </a:solidFill>
+                <a:latin typeface="+mn-lt"/>
+              </a:rPr>
+              <a:t>Scope</a:t>
+            </a:r>
+            <a:endParaRPr lang="nl-NL" dirty="0" err="1">
+              <a:solidFill>
+                <a:srgbClr val="990000"/>
+              </a:solidFill>
+              <a:latin typeface="+mn-lt"/>
+            </a:endParaRPr>
+          </a:p>
+        </p:txBody>
+      </p:sp>
+      <p:sp>
+        <p:nvSpPr>
+          <p:cNvPr id="14" name="TextBox 13">
+            <a:extLst>
+              <a:ext uri="{FF2B5EF4-FFF2-40B4-BE49-F238E27FC236}">
+                <a16:creationId xmlns:a16="http://schemas.microsoft.com/office/drawing/2014/main" id="{AA875649-3972-CDF7-E039-8420370BA651}"/>
+              </a:ext>
+            </a:extLst>
+          </p:cNvPr>
+          <p:cNvSpPr txBox="1"/>
+          <p:nvPr/>
+        </p:nvSpPr>
+        <p:spPr>
+          <a:xfrm>
+            <a:off x="2206774" y="6075041"/>
+            <a:ext cx="720080" cy="246221"/>
+          </a:xfrm>
+          <a:prstGeom prst="rect">
+            <a:avLst/>
+          </a:prstGeom>
+          <a:noFill/>
+        </p:spPr>
+        <p:txBody>
+          <a:bodyPr wrap="square" lIns="0" tIns="0" rIns="0" bIns="0" rtlCol="0">
+            <a:spAutoFit/>
+          </a:bodyPr>
+          <a:lstStyle/>
+          <a:p>
+            <a:pPr algn="ctr">
+              <a:spcBef>
+                <a:spcPts val="432"/>
+              </a:spcBef>
+            </a:pPr>
+            <a:r>
+              <a:rPr lang="en-US" dirty="0">
+                <a:solidFill>
+                  <a:srgbClr val="990000"/>
+                </a:solidFill>
+                <a:latin typeface="+mn-lt"/>
+              </a:rPr>
+              <a:t>Data</a:t>
+            </a:r>
+            <a:endParaRPr lang="nl-NL" dirty="0" err="1">
+              <a:solidFill>
+                <a:srgbClr val="990000"/>
+              </a:solidFill>
+              <a:latin typeface="+mn-lt"/>
+            </a:endParaRPr>
+          </a:p>
+        </p:txBody>
+      </p:sp>
+      <p:sp>
+        <p:nvSpPr>
+          <p:cNvPr id="15" name="TextBox 14">
+            <a:extLst>
+              <a:ext uri="{FF2B5EF4-FFF2-40B4-BE49-F238E27FC236}">
+                <a16:creationId xmlns:a16="http://schemas.microsoft.com/office/drawing/2014/main" id="{7D3CF538-81CA-96E2-D188-A1247C82DDB9}"/>
+              </a:ext>
+            </a:extLst>
+          </p:cNvPr>
+          <p:cNvSpPr txBox="1"/>
+          <p:nvPr/>
+        </p:nvSpPr>
+        <p:spPr>
+          <a:xfrm>
+            <a:off x="3358902" y="6075040"/>
+            <a:ext cx="720080" cy="246221"/>
+          </a:xfrm>
+          <a:prstGeom prst="rect">
+            <a:avLst/>
+          </a:prstGeom>
+          <a:noFill/>
+        </p:spPr>
+        <p:txBody>
+          <a:bodyPr wrap="square" lIns="0" tIns="0" rIns="0" bIns="0" rtlCol="0">
+            <a:spAutoFit/>
+          </a:bodyPr>
+          <a:lstStyle/>
+          <a:p>
+            <a:pPr algn="ctr">
+              <a:spcBef>
+                <a:spcPts val="432"/>
+              </a:spcBef>
+            </a:pPr>
+            <a:r>
+              <a:rPr lang="en-US" dirty="0">
+                <a:solidFill>
+                  <a:srgbClr val="990000"/>
+                </a:solidFill>
+                <a:latin typeface="+mn-lt"/>
+              </a:rPr>
+              <a:t>FFNN</a:t>
+            </a:r>
+            <a:endParaRPr lang="nl-NL" dirty="0" err="1">
+              <a:solidFill>
+                <a:srgbClr val="990000"/>
+              </a:solidFill>
+              <a:latin typeface="+mn-lt"/>
+            </a:endParaRPr>
+          </a:p>
+        </p:txBody>
+      </p:sp>
+      <p:sp>
+        <p:nvSpPr>
+          <p:cNvPr id="16" name="TextBox 15">
+            <a:extLst>
+              <a:ext uri="{FF2B5EF4-FFF2-40B4-BE49-F238E27FC236}">
+                <a16:creationId xmlns:a16="http://schemas.microsoft.com/office/drawing/2014/main" id="{1B1673EB-08DB-8628-C310-CB479D96A776}"/>
+              </a:ext>
+            </a:extLst>
+          </p:cNvPr>
+          <p:cNvSpPr txBox="1"/>
+          <p:nvPr/>
+        </p:nvSpPr>
+        <p:spPr>
+          <a:xfrm>
+            <a:off x="4512940" y="6075040"/>
+            <a:ext cx="720080" cy="246221"/>
+          </a:xfrm>
+          <a:prstGeom prst="rect">
+            <a:avLst/>
+          </a:prstGeom>
+          <a:noFill/>
+        </p:spPr>
+        <p:txBody>
+          <a:bodyPr wrap="square" lIns="0" tIns="0" rIns="0" bIns="0" rtlCol="0">
+            <a:spAutoFit/>
+          </a:bodyPr>
+          <a:lstStyle/>
+          <a:p>
+            <a:pPr algn="ctr">
+              <a:spcBef>
+                <a:spcPts val="432"/>
+              </a:spcBef>
+            </a:pPr>
+            <a:r>
+              <a:rPr lang="en-US" dirty="0">
+                <a:solidFill>
+                  <a:srgbClr val="990000"/>
+                </a:solidFill>
+                <a:latin typeface="+mn-lt"/>
+              </a:rPr>
+              <a:t>MLDM</a:t>
+            </a:r>
+            <a:endParaRPr lang="nl-NL" dirty="0" err="1">
+              <a:solidFill>
+                <a:srgbClr val="990000"/>
+              </a:solidFill>
+              <a:latin typeface="+mn-lt"/>
+            </a:endParaRPr>
+          </a:p>
+        </p:txBody>
+      </p:sp>
+      <p:sp>
+        <p:nvSpPr>
+          <p:cNvPr id="17" name="TextBox 16">
+            <a:extLst>
+              <a:ext uri="{FF2B5EF4-FFF2-40B4-BE49-F238E27FC236}">
+                <a16:creationId xmlns:a16="http://schemas.microsoft.com/office/drawing/2014/main" id="{637D7D33-671C-63C3-81B9-341E2A6FD8BC}"/>
+              </a:ext>
+            </a:extLst>
+          </p:cNvPr>
+          <p:cNvSpPr txBox="1"/>
+          <p:nvPr/>
+        </p:nvSpPr>
+        <p:spPr>
+          <a:xfrm>
+            <a:off x="5638825" y="6075040"/>
+            <a:ext cx="720080" cy="246221"/>
+          </a:xfrm>
+          <a:prstGeom prst="rect">
+            <a:avLst/>
+          </a:prstGeom>
+          <a:noFill/>
+        </p:spPr>
+        <p:txBody>
+          <a:bodyPr wrap="square" lIns="0" tIns="0" rIns="0" bIns="0" rtlCol="0">
+            <a:spAutoFit/>
+          </a:bodyPr>
+          <a:lstStyle/>
+          <a:p>
+            <a:pPr algn="ctr">
+              <a:spcBef>
+                <a:spcPts val="432"/>
+              </a:spcBef>
+            </a:pPr>
+            <a:r>
+              <a:rPr lang="en-US" dirty="0">
+                <a:solidFill>
+                  <a:srgbClr val="990000"/>
+                </a:solidFill>
+                <a:latin typeface="+mn-lt"/>
+              </a:rPr>
+              <a:t>LSTM</a:t>
+            </a:r>
+            <a:endParaRPr lang="nl-NL" dirty="0" err="1">
+              <a:solidFill>
+                <a:srgbClr val="990000"/>
+              </a:solidFill>
+              <a:latin typeface="+mn-lt"/>
+            </a:endParaRPr>
+          </a:p>
+        </p:txBody>
+      </p:sp>
+      <p:sp>
+        <p:nvSpPr>
+          <p:cNvPr id="18" name="TextBox 17">
+            <a:extLst>
+              <a:ext uri="{FF2B5EF4-FFF2-40B4-BE49-F238E27FC236}">
+                <a16:creationId xmlns:a16="http://schemas.microsoft.com/office/drawing/2014/main" id="{02A66749-E3BC-8D58-3947-ACD80CB36568}"/>
+              </a:ext>
+            </a:extLst>
+          </p:cNvPr>
+          <p:cNvSpPr txBox="1"/>
+          <p:nvPr/>
+        </p:nvSpPr>
+        <p:spPr>
+          <a:xfrm>
+            <a:off x="6817196" y="6075040"/>
+            <a:ext cx="720080" cy="492443"/>
+          </a:xfrm>
+          <a:prstGeom prst="rect">
+            <a:avLst/>
+          </a:prstGeom>
+          <a:noFill/>
+        </p:spPr>
+        <p:txBody>
+          <a:bodyPr wrap="square" lIns="0" tIns="0" rIns="0" bIns="0" rtlCol="0">
+            <a:spAutoFit/>
+          </a:bodyPr>
+          <a:lstStyle/>
+          <a:p>
+            <a:pPr algn="ctr">
+              <a:spcBef>
+                <a:spcPts val="432"/>
+              </a:spcBef>
+            </a:pPr>
+            <a:r>
+              <a:rPr lang="en-US" dirty="0">
+                <a:solidFill>
+                  <a:srgbClr val="990000"/>
+                </a:solidFill>
+                <a:latin typeface="+mn-lt"/>
+              </a:rPr>
+              <a:t>Further Plans</a:t>
+            </a:r>
+            <a:endParaRPr lang="nl-NL" dirty="0" err="1">
+              <a:solidFill>
+                <a:srgbClr val="990000"/>
+              </a:solidFill>
+              <a:latin typeface="+mn-lt"/>
+            </a:endParaRPr>
+          </a:p>
+        </p:txBody>
+      </p:sp>
+    </p:spTree>
+    <p:extLst>
+      <p:ext uri="{BB962C8B-B14F-4D97-AF65-F5344CB8AC3E}">
+        <p14:creationId xmlns:p14="http://schemas.microsoft.com/office/powerpoint/2010/main" val="3173100887"/>
+      </p:ext>
+    </p:extLst>
+  </p:cSld>
+  <p:clrMapOvr>
+    <a:masterClrMapping/>
+  </p:clrMapOvr>
+</p:sld>
+</file>
+
+<file path=ppt/slides/slide7.xml><?xml version="1.0" encoding="utf-8"?>
+<p:sld xmlns:a="http://schemas.openxmlformats.org/drawingml/2006/main" xmlns:r="http://schemas.openxmlformats.org/officeDocument/2006/relationships" xmlns:p="http://schemas.openxmlformats.org/presentationml/2006/main">
+  <p:cSld>
+    <p:spTree>
+      <p:nvGrpSpPr>
+        <p:cNvPr id="1" name=""/>
+        <p:cNvGrpSpPr/>
+        <p:nvPr/>
+      </p:nvGrpSpPr>
+      <p:grpSpPr>
+        <a:xfrm>
+          <a:off x="0" y="0"/>
+          <a:ext cx="0" cy="0"/>
+          <a:chOff x="0" y="0"/>
+          <a:chExt cx="0" cy="0"/>
+        </a:xfrm>
+      </p:grpSpPr>
+      <p:sp>
+        <p:nvSpPr>
+          <p:cNvPr id="2" name="Title 1">
+            <a:extLst>
+              <a:ext uri="{FF2B5EF4-FFF2-40B4-BE49-F238E27FC236}">
                 <a16:creationId xmlns:a16="http://schemas.microsoft.com/office/drawing/2014/main" id="{5241E114-141C-499A-8D76-AD728009E9CF}"/>
               </a:ext>
             </a:extLst>
@@ -12795,7 +13684,7 @@
             <a:fld id="{103EA872-A674-449B-A120-B97244F8E91D}" type="slidenum">
               <a:rPr lang="en-GB" smtClean="0"/>
               <a:pPr/>
-              <a:t>6</a:t>
+              <a:t>7</a:t>
             </a:fld>
             <a:endParaRPr lang="en-GB" dirty="0"/>
           </a:p>
@@ -13614,7 +14503,7 @@
 </p:sld>
 </file>
 
-<file path=ppt/slides/slide7.xml><?xml version="1.0" encoding="utf-8"?>
+<file path=ppt/slides/slide8.xml><?xml version="1.0" encoding="utf-8"?>
 <p:sld xmlns:a="http://schemas.openxmlformats.org/drawingml/2006/main" xmlns:r="http://schemas.openxmlformats.org/officeDocument/2006/relationships" xmlns:p="http://schemas.openxmlformats.org/presentationml/2006/main">
   <p:cSld>
     <p:spTree>
@@ -13684,7 +14573,7 @@
             <a:fld id="{103EA872-A674-449B-A120-B97244F8E91D}" type="slidenum">
               <a:rPr lang="en-GB" smtClean="0"/>
               <a:pPr/>
-              <a:t>7</a:t>
+              <a:t>8</a:t>
             </a:fld>
             <a:endParaRPr lang="en-GB" dirty="0"/>
           </a:p>
@@ -14574,7 +15463,7 @@
 </p:sld>
 </file>
 
-<file path=ppt/slides/slide8.xml><?xml version="1.0" encoding="utf-8"?>
+<file path=ppt/slides/slide9.xml><?xml version="1.0" encoding="utf-8"?>
 <p:sld xmlns:a="http://schemas.openxmlformats.org/drawingml/2006/main" xmlns:r="http://schemas.openxmlformats.org/officeDocument/2006/relationships" xmlns:p="http://schemas.openxmlformats.org/presentationml/2006/main">
   <p:cSld>
     <p:spTree>
@@ -14697,7 +15586,7 @@
             <a:fld id="{103EA872-A674-449B-A120-B97244F8E91D}" type="slidenum">
               <a:rPr lang="en-GB" smtClean="0"/>
               <a:pPr/>
-              <a:t>8</a:t>
+              <a:t>9</a:t>
             </a:fld>
             <a:endParaRPr lang="en-GB" dirty="0"/>
           </a:p>
@@ -16386,11 +17275,11 @@
 </file>
 
 <file path=customXml/item1.xml><?xml version="1.0" encoding="utf-8"?>
-<TemplafyFormConfiguration><![CDATA[{"formFields":[{"required":false,"helpTexts":{"prefix":"","postfix":""},"spacing":{},"type":"datePicker","name":"Date","label":"Date","fullyQualifiedName":"Date"},{"required":false,"placeholder":"","lines":0,"helpTexts":{"prefix":"","postfix":""},"spacing":{},"type":"textBox","name":"PresentationTitle","label":"Presentation title","fullyQualifiedName":"PresentationTitle"}],"formDataEntries":[{"name":"Date","value":"IuW0XXvkihAeaFR+oasw5g=="}]}]]></TemplafyFormConfiguration>
+<TemplafyTemplateConfiguration><![CDATA[{"elementsMetadata":[{"type":"shape","id":"200fc201-9004-4215-ada7-b2360008bfe0","elementConfiguration":{"binding":"UserProfile.Offices.Workarea_{{DocumentLanguage}}","disableUpdates":false,"type":"text"}},{"type":"shape","id":"70d15748-2402-426d-938e-9ee9c7ffcb44","elementConfiguration":{"format":"{{DateFormats.GeneralDate}}","binding":"Form.Date","disableUpdates":false,"type":"date"}},{"type":"shape","id":"c5d933f3-13ee-4215-923c-4dec843af19c","elementConfiguration":{"binding":"Form.PresentationTitle","disableUpdates":false,"type":"text"}}],"transformationConfigurations":[{"language":"{{DocumentLanguage}}","disableUpdates":false,"type":"proofingLanguage"}],"templateName":"","templateDescription":"","enableDocumentContentUpdater":true,"version":"1.2"}]]></TemplafyTemplateConfiguration>
 </file>
 
 <file path=customXml/item2.xml><?xml version="1.0" encoding="utf-8"?>
-<TemplafySlideFormConfiguration><![CDATA[{"formFields":[],"formDataEntries":[]}]]></TemplafySlideFormConfiguration>
+<TemplafySlideTemplateConfiguration><![CDATA[{"documentContentValidatorConfiguration":{"enableDocumentContentValidator":false,"documentContentValidatorVersion":0},"elementsMetadata":[],"slideId":"636957680393408390","enableDocumentContentUpdater":true,"version":"1.2"}]]></TemplafySlideTemplateConfiguration>
 </file>
 
 <file path=customXml/item3.xml><?xml version="1.0" encoding="utf-8"?>
@@ -16398,11 +17287,11 @@
 </file>
 
 <file path=customXml/item4.xml><?xml version="1.0" encoding="utf-8"?>
-<TemplafySlideTemplateConfiguration><![CDATA[{"documentContentValidatorConfiguration":{"enableDocumentContentValidator":false,"documentContentValidatorVersion":0},"elementsMetadata":[],"slideId":"636957680393408390","enableDocumentContentUpdater":true,"version":"1.2"}]]></TemplafySlideTemplateConfiguration>
+<TemplafySlideFormConfiguration><![CDATA[{"formFields":[],"formDataEntries":[]}]]></TemplafySlideFormConfiguration>
 </file>
 
 <file path=customXml/item5.xml><?xml version="1.0" encoding="utf-8"?>
-<TemplafyTemplateConfiguration><![CDATA[{"elementsMetadata":[{"type":"shape","id":"200fc201-9004-4215-ada7-b2360008bfe0","elementConfiguration":{"binding":"UserProfile.Offices.Workarea_{{DocumentLanguage}}","disableUpdates":false,"type":"text"}},{"type":"shape","id":"70d15748-2402-426d-938e-9ee9c7ffcb44","elementConfiguration":{"format":"{{DateFormats.GeneralDate}}","binding":"Form.Date","disableUpdates":false,"type":"date"}},{"type":"shape","id":"c5d933f3-13ee-4215-923c-4dec843af19c","elementConfiguration":{"binding":"Form.PresentationTitle","disableUpdates":false,"type":"text"}}],"transformationConfigurations":[{"language":"{{DocumentLanguage}}","disableUpdates":false,"type":"proofingLanguage"}],"templateName":"","templateDescription":"","enableDocumentContentUpdater":true,"version":"1.2"}]]></TemplafyTemplateConfiguration>
+<TemplafyFormConfiguration><![CDATA[{"formFields":[{"required":false,"helpTexts":{"prefix":"","postfix":""},"spacing":{},"type":"datePicker","name":"Date","label":"Date","fullyQualifiedName":"Date"},{"required":false,"placeholder":"","lines":0,"helpTexts":{"prefix":"","postfix":""},"spacing":{},"type":"textBox","name":"PresentationTitle","label":"Presentation title","fullyQualifiedName":"PresentationTitle"}],"formDataEntries":[{"name":"Date","value":"IuW0XXvkihAeaFR+oasw5g=="}]}]]></TemplafyFormConfiguration>
 </file>
 
 <file path=customXml/item6.xml><?xml version="1.0" encoding="utf-8"?>
@@ -16410,13 +17299,13 @@
 </file>
 
 <file path=customXml/itemProps1.xml><?xml version="1.0" encoding="utf-8"?>
-<ds:datastoreItem xmlns:ds="http://schemas.openxmlformats.org/officeDocument/2006/customXml" ds:itemID="{43763224-B85A-4B53-A86A-261D26A71C30}">
+<ds:datastoreItem xmlns:ds="http://schemas.openxmlformats.org/officeDocument/2006/customXml" ds:itemID="{1334258C-C3E7-4029-A615-C886A240FB15}">
   <ds:schemaRefs/>
 </ds:datastoreItem>
 </file>
 
 <file path=customXml/itemProps2.xml><?xml version="1.0" encoding="utf-8"?>
-<ds:datastoreItem xmlns:ds="http://schemas.openxmlformats.org/officeDocument/2006/customXml" ds:itemID="{9587AFF5-BFB0-40A3-85CA-ADEED7540807}">
+<ds:datastoreItem xmlns:ds="http://schemas.openxmlformats.org/officeDocument/2006/customXml" ds:itemID="{6B8AD017-B053-4E30-93B9-B28A44CEC3A4}">
   <ds:schemaRefs/>
 </ds:datastoreItem>
 </file>
@@ -16428,13 +17317,13 @@
 </file>
 
 <file path=customXml/itemProps4.xml><?xml version="1.0" encoding="utf-8"?>
-<ds:datastoreItem xmlns:ds="http://schemas.openxmlformats.org/officeDocument/2006/customXml" ds:itemID="{6B8AD017-B053-4E30-93B9-B28A44CEC3A4}">
+<ds:datastoreItem xmlns:ds="http://schemas.openxmlformats.org/officeDocument/2006/customXml" ds:itemID="{9587AFF5-BFB0-40A3-85CA-ADEED7540807}">
   <ds:schemaRefs/>
 </ds:datastoreItem>
 </file>
 
 <file path=customXml/itemProps5.xml><?xml version="1.0" encoding="utf-8"?>
-<ds:datastoreItem xmlns:ds="http://schemas.openxmlformats.org/officeDocument/2006/customXml" ds:itemID="{1334258C-C3E7-4029-A615-C886A240FB15}">
+<ds:datastoreItem xmlns:ds="http://schemas.openxmlformats.org/officeDocument/2006/customXml" ds:itemID="{43763224-B85A-4B53-A86A-261D26A71C30}">
   <ds:schemaRefs/>
 </ds:datastoreItem>
 </file>

</xml_diff>